<commit_message>
Added New Slides, Final Name
</commit_message>
<xml_diff>
--- a/posts/HighCarbIntake/slides.pptx
+++ b/posts/HighCarbIntake/slides.pptx
@@ -3953,8 +3953,8 @@
         </p:nvSpPr>
         <p:spPr bwMode="auto">
           <a:xfrm rot="0" flipH="0" flipV="0">
-            <a:off x="-427816" y="163462"/>
-            <a:ext cx="11099723" cy="782552"/>
+            <a:off x="-427814" y="163461"/>
+            <a:ext cx="11188282" cy="782552"/>
           </a:xfrm>
           <a:prstGeom prst="rect">
             <a:avLst/>
@@ -3981,7 +3981,7 @@
                 <a:ea typeface="Agave"/>
                 <a:cs typeface="Agave"/>
               </a:rPr>
-              <a:t>Eating Too Many Carbs Increases Cardiovascular Disease risk</a:t>
+              <a:t>High Glycemic Loads Increase Cardiovascular Disease Risk</a:t>
             </a:r>
             <a:endParaRPr sz="2700" b="0">
               <a:solidFill>
@@ -4025,8 +4025,8 @@
         </p:nvSpPr>
         <p:spPr bwMode="auto">
           <a:xfrm flipH="0" flipV="0">
-            <a:off x="4572000" y="2588074"/>
-            <a:ext cx="3863898" cy="823319"/>
+            <a:off x="4572000" y="2588073"/>
+            <a:ext cx="3883338" cy="823319"/>
           </a:xfrm>
           <a:prstGeom prst="rect">
             <a:avLst/>
@@ -4050,7 +4050,7 @@
                 <a:ea typeface="Agave"/>
                 <a:cs typeface="Agave"/>
               </a:rPr>
-              <a:t>risk of a person eating too many carbs in a day</a:t>
+              <a:t>risk of a person eating close to twice the RDA</a:t>
             </a:r>
             <a:endParaRPr sz="2400">
               <a:solidFill>
@@ -4125,8 +4125,8 @@
         </p:nvSpPr>
         <p:spPr bwMode="auto">
           <a:xfrm flipH="0" flipV="0">
-            <a:off x="1998740" y="4811124"/>
-            <a:ext cx="2176019" cy="1554840"/>
+            <a:off x="1960420" y="4828189"/>
+            <a:ext cx="3954888" cy="1554840"/>
           </a:xfrm>
           <a:prstGeom prst="rect">
             <a:avLst/>
@@ -4149,7 +4149,7 @@
                 <a:latin typeface="Agave"/>
                 <a:cs typeface="Agave"/>
               </a:rPr>
-              <a:t>risk for a person not eating any carbs</a:t>
+              <a:t>risk for a person taking the minimum Recommended Daily Allowance (RDA) i.e 130 g/day</a:t>
             </a:r>
             <a:endParaRPr sz="2400">
               <a:solidFill>
@@ -4325,8 +4325,8 @@
         </p:nvSpPr>
         <p:spPr bwMode="auto">
           <a:xfrm flipH="0" flipV="0">
-            <a:off x="3291827" y="8523280"/>
-            <a:ext cx="5136968" cy="427079"/>
+            <a:off x="3291826" y="8523279"/>
+            <a:ext cx="5145246" cy="488039"/>
           </a:xfrm>
           <a:prstGeom prst="rect">
             <a:avLst/>
@@ -4342,7 +4342,7 @@
               <a:defRPr/>
             </a:pPr>
             <a:r>
-              <a:rPr sz="2200">
+              <a:rPr sz="2600">
                 <a:solidFill>
                   <a:schemeClr val="bg1">
                     <a:lumMod val="75000"/>
@@ -4352,9 +4352,9 @@
                 <a:ea typeface="Agave"/>
                 <a:cs typeface="Agave"/>
               </a:rPr>
-              <a:t>Amount of carbohydrates</a:t>
-            </a:r>
-            <a:endParaRPr sz="2200">
+              <a:t>Glycemic Load per day</a:t>
+            </a:r>
+            <a:endParaRPr sz="2600">
               <a:solidFill>
                 <a:schemeClr val="bg1">
                   <a:lumMod val="75000"/>
@@ -4423,7 +4423,7 @@
           <p:nvPr/>
         </p:nvCxnSpPr>
         <p:spPr bwMode="auto">
-          <a:xfrm rot="10799990" flipH="0" flipV="0">
+          <a:xfrm rot="10799989" flipH="0" flipV="0">
             <a:off x="1092134" y="1906133"/>
             <a:ext cx="0" cy="6361203"/>
           </a:xfrm>
@@ -4466,7 +4466,7 @@
           <p:nvPr/>
         </p:nvCxnSpPr>
         <p:spPr bwMode="auto">
-          <a:xfrm rot="5399978" flipH="0" flipV="1">
+          <a:xfrm rot="5399976" flipH="0" flipV="1">
             <a:off x="7505042" y="2775387"/>
             <a:ext cx="689741" cy="2430516"/>
           </a:xfrm>
@@ -4547,6 +4547,92 @@
           </a:p>
         </p:txBody>
       </p:sp>
+      <p:sp>
+        <p:nvSpPr>
+          <p:cNvPr id="1544106469" name=""/>
+          <p:cNvSpPr txBox="1"/>
+          <p:nvPr/>
+        </p:nvSpPr>
+        <p:spPr bwMode="auto">
+          <a:xfrm flipH="0" flipV="0">
+            <a:off x="1669830" y="3512187"/>
+            <a:ext cx="3891978" cy="457559"/>
+          </a:xfrm>
+          <a:prstGeom prst="rect">
+            <a:avLst/>
+          </a:prstGeom>
+          <a:noFill/>
+        </p:spPr>
+        <p:txBody>
+          <a:bodyPr vertOverflow="overflow" horzOverflow="overflow" vert="horz" wrap="square" lIns="91440" tIns="45720" rIns="91440" bIns="45720" numCol="1" spcCol="0" rtlCol="0" fromWordArt="0" anchor="t" anchorCtr="0" forceAA="0" upright="0" compatLnSpc="0">
+            <a:spAutoFit/>
+          </a:bodyPr>
+          <a:p>
+            <a:pPr>
+              <a:defRPr/>
+            </a:pPr>
+            <a:r>
+              <a:rPr sz="2400">
+                <a:solidFill>
+                  <a:schemeClr val="bg1"/>
+                </a:solidFill>
+                <a:latin typeface="Agave"/>
+                <a:ea typeface="Agave"/>
+                <a:cs typeface="Agave"/>
+              </a:rPr>
+              <a:t>range of risk</a:t>
+            </a:r>
+            <a:endParaRPr sz="2400">
+              <a:solidFill>
+                <a:schemeClr val="bg1"/>
+              </a:solidFill>
+              <a:latin typeface="Agave"/>
+              <a:cs typeface="Agave"/>
+            </a:endParaRPr>
+          </a:p>
+        </p:txBody>
+      </p:sp>
+      <p:cxnSp>
+        <p:nvCxnSpPr>
+          <p:cNvPr id="1921275789" name=""/>
+          <p:cNvCxnSpPr>
+            <a:cxnSpLocks/>
+          </p:cNvCxnSpPr>
+          <p:nvPr/>
+        </p:nvCxnSpPr>
+        <p:spPr bwMode="auto">
+          <a:xfrm rot="5399942" flipH="0" flipV="1">
+            <a:off x="4625201" y="2391769"/>
+            <a:ext cx="800111" cy="3941373"/>
+          </a:xfrm>
+          <a:prstGeom prst="curvedConnector2">
+            <a:avLst/>
+          </a:prstGeom>
+          <a:ln w="38099" cap="flat" cmpd="sng" algn="ctr">
+            <a:solidFill>
+              <a:schemeClr val="bg1"/>
+            </a:solidFill>
+            <a:prstDash val="solid"/>
+            <a:tailEnd type="arrow" len="med"/>
+          </a:ln>
+        </p:spPr>
+        <p:style>
+          <a:lnRef idx="1">
+            <a:schemeClr val="accent1">
+              <a:shade val="50000"/>
+            </a:schemeClr>
+          </a:lnRef>
+          <a:fillRef idx="0">
+            <a:schemeClr val="accent1"/>
+          </a:fillRef>
+          <a:effectRef idx="0">
+            <a:schemeClr val="accent1"/>
+          </a:effectRef>
+          <a:fontRef idx="minor">
+            <a:schemeClr val="tx1"/>
+          </a:fontRef>
+        </p:style>
+      </p:cxnSp>
     </p:spTree>
   </p:cSld>
   <p:clrMapOvr>
@@ -4735,8 +4821,8 @@
         </p:nvSpPr>
         <p:spPr bwMode="auto">
           <a:xfrm flipH="0" flipV="0">
-            <a:off x="1136543" y="2140446"/>
-            <a:ext cx="8149476" cy="5943959"/>
+            <a:off x="1028691" y="1785079"/>
+            <a:ext cx="8479953" cy="7772759"/>
           </a:xfrm>
           <a:prstGeom prst="rect">
             <a:avLst/>
@@ -4749,40 +4835,6 @@
           </a:bodyPr>
           <a:p>
             <a:pPr>
-              <a:defRPr/>
-            </a:pPr>
-            <a:r>
-              <a:rPr lang="en-US" sz="2600" b="0" i="0" u="sng" strike="noStrike" cap="none" spc="0">
-                <a:solidFill>
-                  <a:schemeClr val="bg1"/>
-                </a:solidFill>
-                <a:latin typeface="Agave"/>
-                <a:cs typeface="Agave"/>
-              </a:rPr>
-              <a:t>Key Takeaways:</a:t>
-            </a:r>
-            <a:endParaRPr sz="2600" b="0" i="0" u="sng" strike="noStrike" cap="none" spc="0">
-              <a:solidFill>
-                <a:schemeClr val="bg1"/>
-              </a:solidFill>
-              <a:latin typeface="Agave"/>
-              <a:cs typeface="Agave"/>
-            </a:endParaRPr>
-          </a:p>
-          <a:p>
-            <a:pPr>
-              <a:defRPr/>
-            </a:pPr>
-            <a:endParaRPr sz="2600" b="0" i="0" u="none" strike="noStrike" cap="none" spc="0">
-              <a:solidFill>
-                <a:schemeClr val="bg1"/>
-              </a:solidFill>
-              <a:latin typeface="Agave"/>
-              <a:cs typeface="Agave"/>
-            </a:endParaRPr>
-          </a:p>
-          <a:p>
-            <a:pPr algn="l">
               <a:defRPr/>
             </a:pPr>
             <a:r>
@@ -4794,9 +4846,9 @@
                 <a:ea typeface="Agave"/>
                 <a:cs typeface="Agave"/>
               </a:rPr>
-              <a:t>Plant and animal proteins affect Cardio Vascular Disease differently.</a:t>
-            </a:r>
-            <a:endParaRPr sz="2800" b="0" i="0" u="none" strike="noStrike" cap="none" spc="0">
+              <a:t>Glycemic Load means how quickly a food increases your blood sugar.</a:t>
+            </a:r>
+            <a:endParaRPr lang="en-US" sz="2600" b="0" i="0" u="none" strike="noStrike" cap="none" spc="0">
               <a:solidFill>
                 <a:schemeClr val="bg1"/>
               </a:solidFill>
@@ -4806,10 +4858,10 @@
             </a:endParaRPr>
           </a:p>
           <a:p>
-            <a:pPr algn="l">
-              <a:defRPr/>
-            </a:pPr>
-            <a:endParaRPr sz="3600">
+            <a:pPr>
+              <a:defRPr/>
+            </a:pPr>
+            <a:endParaRPr lang="en-US" sz="2600" b="0" i="0" u="none" strike="noStrike" cap="none" spc="0">
               <a:solidFill>
                 <a:schemeClr val="bg1"/>
               </a:solidFill>
@@ -4830,19 +4882,32 @@
                 <a:ea typeface="Agave"/>
                 <a:cs typeface="Agave"/>
               </a:rPr>
-              <a:t>A high contribution of </a:t>
-            </a:r>
-            <a:r>
-              <a:rPr lang="en-US" sz="2600" b="1" i="0" u="none" strike="noStrike" cap="none" spc="0">
-                <a:solidFill>
-                  <a:srgbClr val="EB6F92"/>
-                </a:solidFill>
-                <a:latin typeface="Agave"/>
-                <a:ea typeface="Agave"/>
-                <a:cs typeface="Agave"/>
-              </a:rPr>
-              <a:t>protein from meat increased risk of cardio vascular disease</a:t>
-            </a:r>
+              <a:t>Foods like added sugar, candy, white flour, white rice and breakfast meal and drinks with added sugar have a higher glycemic load than fruits and whole foods.</a:t>
+            </a:r>
+            <a:endParaRPr lang="en-US" sz="2600" b="0" i="0" u="none" strike="noStrike" cap="none" spc="0">
+              <a:solidFill>
+                <a:schemeClr val="bg1"/>
+              </a:solidFill>
+              <a:latin typeface="Agave"/>
+              <a:cs typeface="Agave"/>
+            </a:endParaRPr>
+          </a:p>
+          <a:p>
+            <a:pPr>
+              <a:defRPr/>
+            </a:pPr>
+            <a:endParaRPr lang="en-US" sz="2600" b="0" i="0" u="none" strike="noStrike" cap="none" spc="0">
+              <a:solidFill>
+                <a:schemeClr val="bg1"/>
+              </a:solidFill>
+              <a:latin typeface="Agave"/>
+              <a:cs typeface="Agave"/>
+            </a:endParaRPr>
+          </a:p>
+          <a:p>
+            <a:pPr>
+              <a:defRPr/>
+            </a:pPr>
             <a:r>
               <a:rPr lang="en-US" sz="2600" b="0" i="0" u="none" strike="noStrike" cap="none" spc="0">
                 <a:solidFill>
@@ -4852,7 +4917,7 @@
                 <a:ea typeface="Agave"/>
                 <a:cs typeface="Agave"/>
               </a:rPr>
-              <a:t>, </a:t>
+              <a:t>A </a:t>
             </a:r>
             <a:r>
               <a:rPr lang="en-US" sz="2600" b="0" i="0" u="none" strike="noStrike" cap="none" spc="0">
@@ -4863,18 +4928,7 @@
                 <a:ea typeface="Agave"/>
                 <a:cs typeface="Agave"/>
               </a:rPr>
-              <a:t>whereas a high contribution of </a:t>
-            </a:r>
-            <a:r>
-              <a:rPr lang="en-US" sz="2600" b="1" i="0" u="none" strike="noStrike" cap="none" spc="0">
-                <a:solidFill>
-                  <a:srgbClr val="EB6F92"/>
-                </a:solidFill>
-                <a:latin typeface="Agave"/>
-                <a:ea typeface="Agave"/>
-                <a:cs typeface="Agave"/>
-              </a:rPr>
-              <a:t>protein from nuts and seeds is protective</a:t>
+              <a:t>glycemic load from refined foods like white flour increases the risk of </a:t>
             </a:r>
             <a:r>
               <a:rPr lang="en-US" sz="2600" b="0" i="0" u="none" strike="noStrike" cap="none" spc="0">
@@ -4885,13 +4939,14 @@
                 <a:ea typeface="Agave"/>
                 <a:cs typeface="Agave"/>
               </a:rPr>
-              <a:t>.</a:t>
-            </a:r>
-            <a:endParaRPr sz="2600" b="0" i="0" u="none" strike="noStrike" cap="none" spc="0">
+              <a:t>CVD, independent of known coronary disease risk factors.</a:t>
+            </a:r>
+            <a:endParaRPr lang="en-US" sz="2600" b="0" i="0" u="none" strike="noStrike" cap="none" spc="0">
               <a:solidFill>
                 <a:schemeClr val="bg1"/>
               </a:solidFill>
               <a:latin typeface="Agave"/>
+              <a:ea typeface="Agave"/>
               <a:cs typeface="Agave"/>
             </a:endParaRPr>
           </a:p>
@@ -4920,8 +4975,56 @@
                 <a:ea typeface="Agave"/>
                 <a:cs typeface="Agave"/>
               </a:rPr>
-              <a:t>These associations were not influenced by other characteristics of the diet, like being vegetarian</a:t>
-            </a:r>
+              <a:t>The risk of CVD when taking a higher glycemic load was higher in women with above average weights</a:t>
+            </a:r>
+            <a:endParaRPr lang="en-US" sz="2600" b="0" i="0" u="none" strike="noStrike" cap="none" spc="0">
+              <a:solidFill>
+                <a:schemeClr val="bg1"/>
+              </a:solidFill>
+              <a:latin typeface="Agave"/>
+              <a:ea typeface="Agave"/>
+              <a:cs typeface="Agave"/>
+            </a:endParaRPr>
+          </a:p>
+          <a:p>
+            <a:pPr>
+              <a:defRPr/>
+            </a:pPr>
+            <a:endParaRPr lang="en-US" sz="2600" b="0" i="0" u="none" strike="noStrike" cap="none" spc="0">
+              <a:solidFill>
+                <a:schemeClr val="bg1"/>
+              </a:solidFill>
+              <a:latin typeface="Agave"/>
+              <a:cs typeface="Agave"/>
+            </a:endParaRPr>
+          </a:p>
+          <a:p>
+            <a:pPr>
+              <a:defRPr/>
+            </a:pPr>
+            <a:r>
+              <a:rPr lang="en-US" sz="2600" b="0" i="0" u="none" strike="noStrike" cap="none" spc="0">
+                <a:solidFill>
+                  <a:srgbClr val="FFC000"/>
+                </a:solidFill>
+                <a:latin typeface="Agave"/>
+                <a:ea typeface="Agave"/>
+                <a:cs typeface="Agave"/>
+              </a:rPr>
+              <a:t>Am I eating foods that are giving me a high glycemic load? How can I replace them with better foods that can protect me instead?</a:t>
+            </a:r>
+            <a:endParaRPr lang="en-US" sz="2600" b="0" i="0" u="none" strike="noStrike" cap="none" spc="0">
+              <a:solidFill>
+                <a:schemeClr val="bg1"/>
+              </a:solidFill>
+              <a:latin typeface="Agave"/>
+              <a:cs typeface="Agave"/>
+            </a:endParaRPr>
+          </a:p>
+          <a:p>
+            <a:pPr>
+              <a:defRPr/>
+            </a:pPr>
             <a:endParaRPr sz="2600" b="0" i="0" u="none" strike="noStrike" cap="none" spc="0">
               <a:solidFill>
                 <a:schemeClr val="bg1"/>
@@ -4930,18 +5033,6 @@
               <a:cs typeface="Agave"/>
             </a:endParaRPr>
           </a:p>
-          <a:p>
-            <a:pPr>
-              <a:defRPr/>
-            </a:pPr>
-            <a:endParaRPr sz="2600" b="0" i="0" u="none" strike="noStrike" cap="none" spc="0">
-              <a:solidFill>
-                <a:schemeClr val="bg1"/>
-              </a:solidFill>
-              <a:latin typeface="Agave"/>
-              <a:cs typeface="Agave"/>
-            </a:endParaRPr>
-          </a:p>
         </p:txBody>
       </p:sp>
       <p:sp>
@@ -4952,8 +5043,8 @@
         </p:nvSpPr>
         <p:spPr bwMode="auto">
           <a:xfrm rot="0" flipH="0" flipV="0">
-            <a:off x="-291597" y="163462"/>
-            <a:ext cx="10967963" cy="1056745"/>
+            <a:off x="-291596" y="163461"/>
+            <a:ext cx="10968682" cy="1056872"/>
           </a:xfrm>
           <a:prstGeom prst="rect">
             <a:avLst/>
@@ -4980,7 +5071,7 @@
                 <a:ea typeface="Agave"/>
                 <a:cs typeface="Agave"/>
               </a:rPr>
-              <a:t>Plant Protein, Animal Protein and Cardio Vascular Disease</a:t>
+              <a:t>High Glycemic Loads Increase Cardiovascular Disease Risk</a:t>
             </a:r>
             <a:endParaRPr sz="2700" b="0">
               <a:solidFill>
@@ -5004,14 +5095,14 @@
       </p:sp>
       <p:sp>
         <p:nvSpPr>
-          <p:cNvPr id="573240558" name="TextBox 6"/>
+          <p:cNvPr id="361070276" name="TextBox 6"/>
           <p:cNvSpPr txBox="1"/>
           <p:nvPr/>
         </p:nvSpPr>
         <p:spPr bwMode="auto">
           <a:xfrm rot="0" flipH="0" flipV="0">
-            <a:off x="-80786" y="710789"/>
-            <a:ext cx="10544541" cy="782425"/>
+            <a:off x="-80785" y="710787"/>
+            <a:ext cx="10561460" cy="782552"/>
           </a:xfrm>
           <a:prstGeom prst="rect">
             <a:avLst/>
@@ -5030,26 +5121,32 @@
               <a:defRPr/>
             </a:pPr>
             <a:r>
-              <a:rPr lang="en-US" sz="2600" b="0">
+              <a:rPr lang="en-US" sz="2000" b="0">
                 <a:solidFill>
-                  <a:schemeClr val="bg1"/>
+                  <a:schemeClr val="accent1">
+                    <a:lumMod val="60000"/>
+                    <a:lumOff val="40000"/>
+                  </a:schemeClr>
                 </a:solidFill>
                 <a:latin typeface="Agave"/>
                 <a:ea typeface="Agave"/>
                 <a:cs typeface="Agave"/>
               </a:rPr>
-              <a:t>Bernstein et al, </a:t>
-            </a:r>
-            <a:r>
-              <a:rPr lang="en-US" sz="2600" b="0" i="0" u="none" strike="noStrike" cap="none" spc="0">
+              <a:t>Liu et al, 2000, </a:t>
+            </a:r>
+            <a:r>
+              <a:rPr lang="en-US" sz="2000" b="0" i="0" u="none" strike="noStrike" cap="none" spc="0">
                 <a:solidFill>
-                  <a:schemeClr val="bg1"/>
+                  <a:schemeClr val="accent1">
+                    <a:lumMod val="60000"/>
+                    <a:lumOff val="40000"/>
+                  </a:schemeClr>
                 </a:solidFill>
                 <a:latin typeface="Agave"/>
                 <a:ea typeface="Agave"/>
                 <a:cs typeface="Agave"/>
               </a:rPr>
-              <a:t>Circulation, Volume 122, Number 9, 2010.</a:t>
+              <a:t>American Journal of Clinical Nutrition, 71(6), 1455–1461.</a:t>
             </a:r>
             <a:endParaRPr sz="2600" b="0">
               <a:solidFill>
@@ -5249,8 +5346,8 @@
         </p:nvSpPr>
         <p:spPr bwMode="auto">
           <a:xfrm flipH="0" flipV="0">
-            <a:off x="1004106" y="1869805"/>
-            <a:ext cx="8235876" cy="7437479"/>
+            <a:off x="1004104" y="1869804"/>
+            <a:ext cx="8246314" cy="6431639"/>
           </a:xfrm>
           <a:prstGeom prst="rect">
             <a:avLst/>
@@ -5266,7 +5363,7 @@
               <a:defRPr/>
             </a:pPr>
             <a:r>
-              <a:rPr lang="en-US" sz="2400" b="0" i="0" u="sng" strike="noStrike" cap="none" spc="0">
+              <a:rPr lang="en-US" sz="2600" b="0" i="0" u="none" strike="noStrike" cap="none" spc="0">
                 <a:solidFill>
                   <a:schemeClr val="bg1"/>
                 </a:solidFill>
@@ -5274,9 +5371,55 @@
                 <a:ea typeface="Agave"/>
                 <a:cs typeface="Agave"/>
               </a:rPr>
-              <a:t>From the Health Message</a:t>
-            </a:r>
-            <a:endParaRPr lang="en-US" sz="2400" b="0" i="0" u="sng" strike="noStrike" cap="none" spc="0">
+              <a:t>Proverbs 25:16 Have you found honey?</a:t>
+            </a:r>
+            <a:endParaRPr sz="2600" b="0" i="0" u="none" strike="noStrike" cap="none" spc="0">
+              <a:solidFill>
+                <a:schemeClr val="bg1"/>
+              </a:solidFill>
+              <a:latin typeface="Agave"/>
+              <a:cs typeface="Agave"/>
+            </a:endParaRPr>
+          </a:p>
+          <a:p>
+            <a:pPr>
+              <a:defRPr/>
+            </a:pPr>
+            <a:r>
+              <a:rPr lang="en-US" sz="2600" b="0" i="0" u="none" strike="noStrike" cap="none" spc="0">
+                <a:solidFill>
+                  <a:schemeClr val="bg1"/>
+                </a:solidFill>
+                <a:latin typeface="Agave"/>
+                <a:ea typeface="Agave"/>
+                <a:cs typeface="Agave"/>
+              </a:rPr>
+              <a:t> Eat as much as is sufficient for you,</a:t>
+            </a:r>
+            <a:endParaRPr sz="2600" b="0" i="0" u="none" strike="noStrike" cap="none" spc="0">
+              <a:solidFill>
+                <a:schemeClr val="bg1"/>
+              </a:solidFill>
+              <a:latin typeface="Agave"/>
+              <a:cs typeface="Agave"/>
+            </a:endParaRPr>
+          </a:p>
+          <a:p>
+            <a:pPr>
+              <a:defRPr/>
+            </a:pPr>
+            <a:r>
+              <a:rPr lang="en-US" sz="2600" b="0" i="0" u="none" strike="noStrike" cap="none" spc="0">
+                <a:solidFill>
+                  <a:schemeClr val="bg1"/>
+                </a:solidFill>
+                <a:latin typeface="Agave"/>
+                <a:ea typeface="Agave"/>
+                <a:cs typeface="Agave"/>
+              </a:rPr>
+              <a:t> lest you eat too much, and vomit it.</a:t>
+            </a:r>
+            <a:endParaRPr lang="en-US" sz="2600" b="0" i="0" u="sng" strike="noStrike" cap="none" spc="0">
               <a:solidFill>
                 <a:schemeClr val="bg1"/>
               </a:solidFill>
@@ -5289,7 +5432,7 @@
             <a:pPr>
               <a:defRPr/>
             </a:pPr>
-            <a:endParaRPr sz="2400" b="0" i="0" u="sng" strike="noStrike" cap="none" spc="0">
+            <a:endParaRPr sz="2600" b="0" i="0" u="sng" strike="noStrike" cap="none" spc="0">
               <a:solidFill>
                 <a:schemeClr val="bg1"/>
               </a:solidFill>
@@ -5303,7 +5446,7 @@
               <a:defRPr/>
             </a:pPr>
             <a:r>
-              <a:rPr lang="en-US" sz="2400" b="0" i="0" u="none" strike="noStrike" cap="none" spc="0">
+              <a:rPr lang="en-US" sz="2600" b="0" i="0" u="none" strike="noStrike" cap="none" spc="0">
                 <a:solidFill>
                   <a:schemeClr val="bg1"/>
                 </a:solidFill>
@@ -5311,10 +5454,35 @@
                 <a:ea typeface="Agave"/>
                 <a:cs typeface="Agave"/>
               </a:rPr>
-              <a:t>God gave our first parents the food He designed that the race should eat.</a:t>
-            </a:r>
-            <a:r>
-              <a:rPr lang="en-US" sz="2400" b="0" i="0" u="none" strike="noStrike" cap="none" spc="0">
+              <a:t>Far too much sugar is ordinarily used in food. Cakes, sweet puddings, pastries, jellies, jams, </a:t>
+            </a:r>
+            <a:endParaRPr sz="2600" b="0" i="0" u="none" strike="noStrike" cap="none" spc="0">
+              <a:solidFill>
+                <a:schemeClr val="bg1"/>
+              </a:solidFill>
+              <a:latin typeface="Agave"/>
+              <a:ea typeface="Agave"/>
+              <a:cs typeface="Agave"/>
+            </a:endParaRPr>
+          </a:p>
+          <a:p>
+            <a:pPr>
+              <a:defRPr/>
+            </a:pPr>
+            <a:endParaRPr sz="2600" b="0" i="0" u="none" strike="noStrike" cap="none" spc="0">
+              <a:solidFill>
+                <a:schemeClr val="bg1"/>
+              </a:solidFill>
+              <a:latin typeface="Agave"/>
+              <a:cs typeface="Agave"/>
+            </a:endParaRPr>
+          </a:p>
+          <a:p>
+            <a:pPr>
+              <a:defRPr/>
+            </a:pPr>
+            <a:r>
+              <a:rPr lang="en-US" sz="2600" b="0" i="0" u="none" strike="noStrike" cap="none" spc="0">
                 <a:solidFill>
                   <a:schemeClr val="bg1"/>
                 </a:solidFill>
@@ -5322,10 +5490,35 @@
                 <a:ea typeface="Agave"/>
                 <a:cs typeface="Agave"/>
               </a:rPr>
-              <a:t>The fruit of </a:t>
-            </a:r>
-            <a:r>
-              <a:rPr lang="en-US" sz="2400" b="0" i="0" u="none" strike="noStrike" cap="none" spc="0">
+              <a:t>“Sugar clogs the system. It hinders the working of the living machine.” (2T 369, 370).</a:t>
+            </a:r>
+            <a:endParaRPr lang="en-US" sz="2600" b="0" i="0" u="none" strike="noStrike" cap="none" spc="0">
+              <a:solidFill>
+                <a:schemeClr val="bg1"/>
+              </a:solidFill>
+              <a:latin typeface="Agave"/>
+              <a:ea typeface="Agave"/>
+              <a:cs typeface="Agave"/>
+            </a:endParaRPr>
+          </a:p>
+          <a:p>
+            <a:pPr>
+              <a:defRPr/>
+            </a:pPr>
+            <a:endParaRPr sz="2600" b="0" i="0" u="none" strike="noStrike" cap="none" spc="0">
+              <a:solidFill>
+                <a:schemeClr val="bg1"/>
+              </a:solidFill>
+              <a:latin typeface="Agave"/>
+              <a:cs typeface="Agave"/>
+            </a:endParaRPr>
+          </a:p>
+          <a:p>
+            <a:pPr>
+              <a:defRPr/>
+            </a:pPr>
+            <a:r>
+              <a:rPr lang="en-US" sz="2600" b="0" i="0" u="none" strike="noStrike" cap="none" spc="0">
                 <a:solidFill>
                   <a:schemeClr val="bg1"/>
                 </a:solidFill>
@@ -5333,10 +5526,10 @@
                 <a:ea typeface="Agave"/>
                 <a:cs typeface="Agave"/>
               </a:rPr>
-              <a:t>the trees in the garden, was the food man’s wants required</a:t>
-            </a:r>
-            <a:r>
-              <a:rPr lang="en-US" sz="2400" b="0" i="0" u="none" strike="noStrike" cap="none" spc="0">
+              <a:t>Fine-flour bread </a:t>
+            </a:r>
+            <a:r>
+              <a:rPr lang="en-US" sz="2600" b="0" i="0" u="none" strike="noStrike" cap="none" spc="0">
                 <a:solidFill>
                   <a:schemeClr val="bg1"/>
                 </a:solidFill>
@@ -5344,10 +5537,10 @@
                 <a:ea typeface="Agave"/>
                 <a:cs typeface="Agave"/>
               </a:rPr>
-              <a:t>. </a:t>
-            </a:r>
-            <a:r>
-              <a:rPr lang="en-US" sz="2400" b="0" i="0" u="none" strike="noStrike" cap="none" spc="0">
+              <a:t>does not impart to the system the nourishment that is to be found in </a:t>
+            </a:r>
+            <a:r>
+              <a:rPr lang="en-US" sz="2600" b="0" i="0" u="none" strike="noStrike" cap="none" spc="0">
                 <a:solidFill>
                   <a:schemeClr val="bg1"/>
                 </a:solidFill>
@@ -5355,10 +5548,10 @@
                 <a:ea typeface="Agave"/>
                 <a:cs typeface="Agave"/>
               </a:rPr>
-              <a:t>God gave man no permission to eat animal food until after the </a:t>
-            </a:r>
-            <a:r>
-              <a:rPr lang="en-US" sz="2400" b="1" i="0" u="none" strike="noStrike" cap="none" spc="0">
+              <a:t>unbolted-wheat bread. Its common use will not keep the system in </a:t>
+            </a:r>
+            <a:r>
+              <a:rPr lang="en-US" sz="2600" b="0" i="0" u="none" strike="noStrike" cap="none" spc="0">
                 <a:solidFill>
                   <a:schemeClr val="bg1"/>
                 </a:solidFill>
@@ -5366,215 +5559,13 @@
                 <a:ea typeface="Agave"/>
                 <a:cs typeface="Agave"/>
               </a:rPr>
-              <a:t>flood</a:t>
-            </a:r>
-            <a:r>
-              <a:rPr lang="en-US" sz="2400" b="0" i="0" u="none" strike="noStrike" cap="none" spc="0">
-                <a:solidFill>
-                  <a:schemeClr val="bg1"/>
-                </a:solidFill>
-                <a:latin typeface="Agave"/>
-                <a:ea typeface="Agave"/>
-                <a:cs typeface="Agave"/>
-              </a:rPr>
-              <a:t>.</a:t>
-            </a:r>
-            <a:endParaRPr sz="2400" b="0" i="0" u="none" strike="noStrike" cap="none" spc="0">
+              <a:t>the best condition. </a:t>
+            </a:r>
+            <a:endParaRPr lang="en-US" sz="2600" b="0" i="0" u="none" strike="noStrike" cap="none" spc="0">
               <a:solidFill>
                 <a:schemeClr val="bg1"/>
               </a:solidFill>
               <a:latin typeface="Agave"/>
-              <a:ea typeface="Agave"/>
-              <a:cs typeface="Agave"/>
-            </a:endParaRPr>
-          </a:p>
-          <a:p>
-            <a:pPr>
-              <a:defRPr/>
-            </a:pPr>
-            <a:endParaRPr sz="2400" b="0" i="0" u="none" strike="noStrike" cap="none" spc="0">
-              <a:solidFill>
-                <a:schemeClr val="bg1"/>
-              </a:solidFill>
-              <a:latin typeface="Agave"/>
-              <a:cs typeface="Agave"/>
-            </a:endParaRPr>
-          </a:p>
-          <a:p>
-            <a:pPr>
-              <a:defRPr/>
-            </a:pPr>
-            <a:r>
-              <a:rPr lang="en-US" sz="2400" b="0" i="0" u="none" strike="noStrike" cap="none" spc="0">
-                <a:solidFill>
-                  <a:schemeClr val="bg1"/>
-                </a:solidFill>
-                <a:latin typeface="Agave"/>
-                <a:ea typeface="Agave"/>
-                <a:cs typeface="Agave"/>
-              </a:rPr>
-              <a:t>Everything had been destroyed upon which man could subsist</a:t>
-            </a:r>
-            <a:r>
-              <a:rPr lang="en-US" sz="2400" b="0" i="0" u="none" strike="noStrike" cap="none" spc="0">
-                <a:solidFill>
-                  <a:schemeClr val="bg1"/>
-                </a:solidFill>
-                <a:latin typeface="Agave"/>
-                <a:ea typeface="Agave"/>
-                <a:cs typeface="Agave"/>
-              </a:rPr>
-              <a:t>...</a:t>
-            </a:r>
-            <a:r>
-              <a:rPr lang="en-US" sz="2400" b="0" i="0" u="none" strike="noStrike" cap="none" spc="0">
-                <a:solidFill>
-                  <a:schemeClr val="bg1"/>
-                </a:solidFill>
-                <a:latin typeface="Agave"/>
-                <a:ea typeface="Agave"/>
-                <a:cs typeface="Agave"/>
-              </a:rPr>
-              <a:t> </a:t>
-            </a:r>
-            <a:r>
-              <a:rPr lang="en-US" sz="2400" b="1" i="0" u="none" strike="noStrike" cap="none" spc="0">
-                <a:solidFill>
-                  <a:srgbClr val="EB6F92"/>
-                </a:solidFill>
-                <a:latin typeface="Agave"/>
-                <a:ea typeface="Agave"/>
-                <a:cs typeface="Agave"/>
-              </a:rPr>
-              <a:t>the </a:t>
-            </a:r>
-            <a:r>
-              <a:rPr lang="en-US" sz="2400" b="1" i="0" u="none" strike="noStrike" cap="none" spc="0">
-                <a:solidFill>
-                  <a:srgbClr val="EB6F92"/>
-                </a:solidFill>
-                <a:latin typeface="Agave"/>
-                <a:ea typeface="Agave"/>
-                <a:cs typeface="Agave"/>
-              </a:rPr>
-              <a:t>Lord</a:t>
-            </a:r>
-            <a:r>
-              <a:rPr lang="en-US" sz="2400" b="1" i="0" u="none" strike="noStrike" cap="none" spc="0">
-                <a:solidFill>
-                  <a:srgbClr val="EB6F92"/>
-                </a:solidFill>
-                <a:latin typeface="Agave"/>
-                <a:ea typeface="Agave"/>
-                <a:cs typeface="Agave"/>
-              </a:rPr>
-              <a:t> in their necessity gave</a:t>
-            </a:r>
-            <a:r>
-              <a:rPr lang="en-US" sz="2400" b="1" i="0" u="none" strike="noStrike" cap="none" spc="0">
-                <a:solidFill>
-                  <a:srgbClr val="EB6F92"/>
-                </a:solidFill>
-                <a:latin typeface="Agave"/>
-                <a:ea typeface="Agave"/>
-                <a:cs typeface="Agave"/>
-              </a:rPr>
-              <a:t> </a:t>
-            </a:r>
-            <a:r>
-              <a:rPr lang="en-US" sz="2400" b="1" i="0" u="none" strike="noStrike" cap="none" spc="0">
-                <a:solidFill>
-                  <a:srgbClr val="EB6F92"/>
-                </a:solidFill>
-                <a:latin typeface="Agave"/>
-                <a:ea typeface="Agave"/>
-                <a:cs typeface="Agave"/>
-              </a:rPr>
-              <a:t>Noah permission to eat</a:t>
-            </a:r>
-            <a:r>
-              <a:rPr lang="en-US" sz="2400" b="0" i="0" u="none" strike="noStrike" cap="none" spc="0">
-                <a:solidFill>
-                  <a:schemeClr val="bg1"/>
-                </a:solidFill>
-                <a:latin typeface="Agave"/>
-                <a:ea typeface="Agave"/>
-                <a:cs typeface="Agave"/>
-              </a:rPr>
-              <a:t> </a:t>
-            </a:r>
-            <a:r>
-              <a:rPr lang="en-US" sz="2400" b="0" i="0" u="none" strike="noStrike" cap="none" spc="0">
-                <a:solidFill>
-                  <a:schemeClr val="bg1"/>
-                </a:solidFill>
-                <a:latin typeface="Agave"/>
-                <a:ea typeface="Agave"/>
-                <a:cs typeface="Agave"/>
-              </a:rPr>
-              <a:t>of the </a:t>
-            </a:r>
-            <a:r>
-              <a:rPr lang="en-US" sz="2400" b="1" i="0" u="none" strike="noStrike" cap="none" spc="0">
-                <a:solidFill>
-                  <a:srgbClr val="EB6F92"/>
-                </a:solidFill>
-                <a:latin typeface="Agave"/>
-                <a:ea typeface="Agave"/>
-                <a:cs typeface="Agave"/>
-              </a:rPr>
-              <a:t>clean </a:t>
-            </a:r>
-            <a:r>
-              <a:rPr lang="en-US" sz="2400" b="0" i="0" u="none" strike="noStrike" cap="none" spc="0">
-                <a:solidFill>
-                  <a:schemeClr val="bg1"/>
-                </a:solidFill>
-                <a:latin typeface="Agave"/>
-                <a:ea typeface="Agave"/>
-                <a:cs typeface="Agave"/>
-              </a:rPr>
-              <a:t>animals which he had taken with him into the ark, </a:t>
-            </a:r>
-            <a:r>
-              <a:rPr lang="en-US" sz="2400" b="1" i="0" u="none" strike="noStrike" cap="none" spc="0">
-                <a:solidFill>
-                  <a:srgbClr val="EB6F92"/>
-                </a:solidFill>
-                <a:latin typeface="Agave"/>
-                <a:ea typeface="Agave"/>
-                <a:cs typeface="Agave"/>
-              </a:rPr>
-              <a:t>but </a:t>
-            </a:r>
-            <a:r>
-              <a:rPr lang="en-US" sz="2400" b="1" i="0" u="none" strike="noStrike" cap="none" spc="0">
-                <a:solidFill>
-                  <a:srgbClr val="EB6F92"/>
-                </a:solidFill>
-                <a:latin typeface="Agave"/>
-                <a:ea typeface="Agave"/>
-                <a:cs typeface="Agave"/>
-              </a:rPr>
-              <a:t>animal food was not the most healthful article of food for man</a:t>
-            </a:r>
-            <a:r>
-              <a:rPr lang="en-US" sz="2400" b="0" i="0" u="none" strike="noStrike" cap="none" spc="0">
-                <a:solidFill>
-                  <a:schemeClr val="bg1"/>
-                </a:solidFill>
-                <a:latin typeface="Agave"/>
-                <a:ea typeface="Agave"/>
-                <a:cs typeface="Agave"/>
-              </a:rPr>
-              <a:t>.</a:t>
-            </a:r>
-            <a:endParaRPr sz="2400" b="0" i="0" u="none" strike="noStrike" cap="none" spc="0">
-              <a:solidFill>
-                <a:schemeClr val="bg1"/>
-              </a:solidFill>
-              <a:latin typeface="Agave"/>
-              <a:ea typeface="Agave"/>
               <a:cs typeface="Agave"/>
             </a:endParaRPr>
           </a:p>
@@ -5595,98 +5586,7 @@
               <a:defRPr/>
             </a:pPr>
             <a:r>
-              <a:rPr lang="en-US" sz="2400" b="0" i="0" u="none" strike="noStrike" cap="none" spc="0">
-                <a:solidFill>
-                  <a:schemeClr val="bg1"/>
-                </a:solidFill>
-                <a:latin typeface="Agave"/>
-                <a:ea typeface="Agave"/>
-                <a:cs typeface="Agave"/>
-              </a:rPr>
-              <a:t>Worldly physicians cannot account for the rapid increase </a:t>
-            </a:r>
-            <a:r>
-              <a:rPr lang="en-US" sz="2400" b="0" i="0" u="none" strike="noStrike" cap="none" spc="0">
-                <a:solidFill>
-                  <a:schemeClr val="bg1"/>
-                </a:solidFill>
-                <a:latin typeface="Agave"/>
-                <a:ea typeface="Agave"/>
-                <a:cs typeface="Agave"/>
-              </a:rPr>
-              <a:t>of disease among the human family. But we know that </a:t>
-            </a:r>
-            <a:r>
-              <a:rPr lang="en-US" sz="2400" b="1" i="0" u="none" strike="noStrike" cap="none" spc="0">
-                <a:solidFill>
-                  <a:srgbClr val="EB6F92"/>
-                </a:solidFill>
-                <a:latin typeface="Agave"/>
-                <a:ea typeface="Agave"/>
-                <a:cs typeface="Agave"/>
-              </a:rPr>
-              <a:t>much of this </a:t>
-            </a:r>
-            <a:r>
-              <a:rPr lang="en-US" sz="2400" b="1" i="0" u="none" strike="noStrike" cap="none" spc="0">
-                <a:solidFill>
-                  <a:srgbClr val="EB6F92"/>
-                </a:solidFill>
-                <a:latin typeface="Agave"/>
-                <a:ea typeface="Agave"/>
-                <a:cs typeface="Agave"/>
-              </a:rPr>
-              <a:t>suffering is caused by the eating of dead fles</a:t>
-            </a:r>
-            <a:r>
-              <a:rPr lang="en-US" sz="2400" b="1" i="0" u="none" strike="noStrike" cap="none" spc="0">
-                <a:solidFill>
-                  <a:srgbClr val="EB6F92"/>
-                </a:solidFill>
-                <a:latin typeface="Agave"/>
-                <a:ea typeface="Agave"/>
-                <a:cs typeface="Agave"/>
-              </a:rPr>
-              <a:t>h</a:t>
-            </a:r>
-            <a:r>
-              <a:rPr lang="en-US" sz="2400" b="0" i="0" u="none" strike="noStrike" cap="none" spc="0">
-                <a:solidFill>
-                  <a:schemeClr val="bg1"/>
-                </a:solidFill>
-                <a:latin typeface="Agave"/>
-                <a:ea typeface="Agave"/>
-                <a:cs typeface="Agave"/>
-              </a:rPr>
-              <a:t>.—Letter 83, 1901</a:t>
-            </a:r>
-            <a:endParaRPr sz="2400" b="0" i="0" u="none" strike="noStrike" cap="none" spc="0">
-              <a:solidFill>
-                <a:schemeClr val="bg1"/>
-              </a:solidFill>
-              <a:latin typeface="Agave"/>
-              <a:ea typeface="Agave"/>
-              <a:cs typeface="Agave"/>
-            </a:endParaRPr>
-          </a:p>
-          <a:p>
-            <a:pPr>
-              <a:defRPr/>
-            </a:pPr>
-            <a:endParaRPr sz="2400" b="0" i="0" u="none" strike="noStrike" cap="none" spc="0">
-              <a:solidFill>
-                <a:schemeClr val="bg1"/>
-              </a:solidFill>
-              <a:latin typeface="Agave"/>
-              <a:cs typeface="Agave"/>
-            </a:endParaRPr>
-          </a:p>
-          <a:p>
-            <a:pPr>
-              <a:defRPr/>
-            </a:pPr>
-            <a:r>
-              <a:rPr lang="en-US" sz="2400" b="0" i="0" u="none" strike="noStrike" cap="none" spc="0">
+              <a:rPr lang="en-US" sz="2600" b="0" i="0" u="none" strike="noStrike" cap="none" spc="0">
                 <a:solidFill>
                   <a:schemeClr val="bg1"/>
                 </a:solidFill>
@@ -5696,7 +5596,7 @@
               </a:rPr>
               <a:t>[Counsels on Food and Diet, Ellen G. White]</a:t>
             </a:r>
-            <a:endParaRPr sz="2400" b="0" i="0" u="none" strike="noStrike" cap="none" spc="0">
+            <a:endParaRPr sz="2600" b="0" i="0" u="none" strike="noStrike" cap="none" spc="0">
               <a:solidFill>
                 <a:schemeClr val="bg1"/>
               </a:solidFill>
@@ -5714,8 +5614,8 @@
         </p:nvSpPr>
         <p:spPr bwMode="auto">
           <a:xfrm rot="0" flipH="0" flipV="0">
-            <a:off x="-291597" y="163462"/>
-            <a:ext cx="10967963" cy="1056745"/>
+            <a:off x="-291596" y="163461"/>
+            <a:ext cx="10968682" cy="1056872"/>
           </a:xfrm>
           <a:prstGeom prst="rect">
             <a:avLst/>
@@ -5742,7 +5642,7 @@
                 <a:ea typeface="Agave"/>
                 <a:cs typeface="Agave"/>
               </a:rPr>
-              <a:t>Plant Protein, Animal Protein and Cardio Vascular Disease</a:t>
+              <a:t>High Glycemic Loads Increase Cardiovascular Disease Risk</a:t>
             </a:r>
             <a:endParaRPr sz="2700" b="0">
               <a:solidFill>
@@ -5766,14 +5666,14 @@
       </p:sp>
       <p:sp>
         <p:nvSpPr>
-          <p:cNvPr id="1580747963" name="TextBox 6"/>
+          <p:cNvPr id="386726756" name="TextBox 6"/>
           <p:cNvSpPr txBox="1"/>
           <p:nvPr/>
         </p:nvSpPr>
         <p:spPr bwMode="auto">
           <a:xfrm rot="0" flipH="0" flipV="0">
-            <a:off x="-80786" y="710789"/>
-            <a:ext cx="10544541" cy="782425"/>
+            <a:off x="-80785" y="710787"/>
+            <a:ext cx="10561460" cy="782552"/>
           </a:xfrm>
           <a:prstGeom prst="rect">
             <a:avLst/>
@@ -5792,26 +5692,32 @@
               <a:defRPr/>
             </a:pPr>
             <a:r>
-              <a:rPr lang="en-US" sz="2600" b="0">
+              <a:rPr lang="en-US" sz="2000" b="0">
                 <a:solidFill>
-                  <a:schemeClr val="bg1"/>
+                  <a:schemeClr val="accent1">
+                    <a:lumMod val="60000"/>
+                    <a:lumOff val="40000"/>
+                  </a:schemeClr>
                 </a:solidFill>
                 <a:latin typeface="Agave"/>
                 <a:ea typeface="Agave"/>
                 <a:cs typeface="Agave"/>
               </a:rPr>
-              <a:t>Bernstein et al, </a:t>
-            </a:r>
-            <a:r>
-              <a:rPr lang="en-US" sz="2600" b="0" i="0" u="none" strike="noStrike" cap="none" spc="0">
+              <a:t>Liu et al, 2000, </a:t>
+            </a:r>
+            <a:r>
+              <a:rPr lang="en-US" sz="2000" b="0" i="0" u="none" strike="noStrike" cap="none" spc="0">
                 <a:solidFill>
-                  <a:schemeClr val="bg1"/>
+                  <a:schemeClr val="accent1">
+                    <a:lumMod val="60000"/>
+                    <a:lumOff val="40000"/>
+                  </a:schemeClr>
                 </a:solidFill>
                 <a:latin typeface="Agave"/>
                 <a:ea typeface="Agave"/>
                 <a:cs typeface="Agave"/>
               </a:rPr>
-              <a:t>Circulation, Volume 122, Number 9, 2010.</a:t>
+              <a:t>American Journal of Clinical Nutrition, 71(6), 1455–1461.</a:t>
             </a:r>
             <a:endParaRPr sz="2600" b="0">
               <a:solidFill>

</xml_diff>